<commit_message>
Added the presemtattion, changed documentation
</commit_message>
<xml_diff>
--- a/Battle of the Hoods.pptx
+++ b/Battle of the Hoods.pptx
@@ -7,6 +7,28 @@
   <p:sldIdLst>
     <p:sldId id="256" r:id="rId2"/>
     <p:sldId id="257" r:id="rId3"/>
+    <p:sldId id="259" r:id="rId4"/>
+    <p:sldId id="260" r:id="rId5"/>
+    <p:sldId id="261" r:id="rId6"/>
+    <p:sldId id="258" r:id="rId7"/>
+    <p:sldId id="262" r:id="rId8"/>
+    <p:sldId id="264" r:id="rId9"/>
+    <p:sldId id="263" r:id="rId10"/>
+    <p:sldId id="265" r:id="rId11"/>
+    <p:sldId id="266" r:id="rId12"/>
+    <p:sldId id="267" r:id="rId13"/>
+    <p:sldId id="268" r:id="rId14"/>
+    <p:sldId id="269" r:id="rId15"/>
+    <p:sldId id="270" r:id="rId16"/>
+    <p:sldId id="271" r:id="rId17"/>
+    <p:sldId id="272" r:id="rId18"/>
+    <p:sldId id="273" r:id="rId19"/>
+    <p:sldId id="274" r:id="rId20"/>
+    <p:sldId id="275" r:id="rId21"/>
+    <p:sldId id="276" r:id="rId22"/>
+    <p:sldId id="277" r:id="rId23"/>
+    <p:sldId id="278" r:id="rId24"/>
+    <p:sldId id="279" r:id="rId25"/>
   </p:sldIdLst>
   <p:sldSz cx="9144000" cy="6858000" type="screen4x3"/>
   <p:notesSz cx="6858000" cy="9144000"/>
@@ -289,7 +311,7 @@
           <a:p>
             <a:fld id="{AD33674F-65ED-4590-818F-BC6276B1D5DF}" type="datetimeFigureOut">
               <a:rPr lang="en-IN" smtClean="0"/>
-              <a:t>28-08-2020</a:t>
+              <a:t>29-08-2020</a:t>
             </a:fld>
             <a:endParaRPr lang="en-IN"/>
           </a:p>
@@ -459,7 +481,7 @@
           <a:p>
             <a:fld id="{AD33674F-65ED-4590-818F-BC6276B1D5DF}" type="datetimeFigureOut">
               <a:rPr lang="en-IN" smtClean="0"/>
-              <a:t>28-08-2020</a:t>
+              <a:t>29-08-2020</a:t>
             </a:fld>
             <a:endParaRPr lang="en-IN"/>
           </a:p>
@@ -639,7 +661,7 @@
           <a:p>
             <a:fld id="{AD33674F-65ED-4590-818F-BC6276B1D5DF}" type="datetimeFigureOut">
               <a:rPr lang="en-IN" smtClean="0"/>
-              <a:t>28-08-2020</a:t>
+              <a:t>29-08-2020</a:t>
             </a:fld>
             <a:endParaRPr lang="en-IN"/>
           </a:p>
@@ -809,7 +831,7 @@
           <a:p>
             <a:fld id="{AD33674F-65ED-4590-818F-BC6276B1D5DF}" type="datetimeFigureOut">
               <a:rPr lang="en-IN" smtClean="0"/>
-              <a:t>28-08-2020</a:t>
+              <a:t>29-08-2020</a:t>
             </a:fld>
             <a:endParaRPr lang="en-IN"/>
           </a:p>
@@ -1055,7 +1077,7 @@
           <a:p>
             <a:fld id="{AD33674F-65ED-4590-818F-BC6276B1D5DF}" type="datetimeFigureOut">
               <a:rPr lang="en-IN" smtClean="0"/>
-              <a:t>28-08-2020</a:t>
+              <a:t>29-08-2020</a:t>
             </a:fld>
             <a:endParaRPr lang="en-IN"/>
           </a:p>
@@ -1343,7 +1365,7 @@
           <a:p>
             <a:fld id="{AD33674F-65ED-4590-818F-BC6276B1D5DF}" type="datetimeFigureOut">
               <a:rPr lang="en-IN" smtClean="0"/>
-              <a:t>28-08-2020</a:t>
+              <a:t>29-08-2020</a:t>
             </a:fld>
             <a:endParaRPr lang="en-IN"/>
           </a:p>
@@ -1765,7 +1787,7 @@
           <a:p>
             <a:fld id="{AD33674F-65ED-4590-818F-BC6276B1D5DF}" type="datetimeFigureOut">
               <a:rPr lang="en-IN" smtClean="0"/>
-              <a:t>28-08-2020</a:t>
+              <a:t>29-08-2020</a:t>
             </a:fld>
             <a:endParaRPr lang="en-IN"/>
           </a:p>
@@ -1883,7 +1905,7 @@
           <a:p>
             <a:fld id="{AD33674F-65ED-4590-818F-BC6276B1D5DF}" type="datetimeFigureOut">
               <a:rPr lang="en-IN" smtClean="0"/>
-              <a:t>28-08-2020</a:t>
+              <a:t>29-08-2020</a:t>
             </a:fld>
             <a:endParaRPr lang="en-IN"/>
           </a:p>
@@ -1978,7 +2000,7 @@
           <a:p>
             <a:fld id="{AD33674F-65ED-4590-818F-BC6276B1D5DF}" type="datetimeFigureOut">
               <a:rPr lang="en-IN" smtClean="0"/>
-              <a:t>28-08-2020</a:t>
+              <a:t>29-08-2020</a:t>
             </a:fld>
             <a:endParaRPr lang="en-IN"/>
           </a:p>
@@ -2255,7 +2277,7 @@
           <a:p>
             <a:fld id="{AD33674F-65ED-4590-818F-BC6276B1D5DF}" type="datetimeFigureOut">
               <a:rPr lang="en-IN" smtClean="0"/>
-              <a:t>28-08-2020</a:t>
+              <a:t>29-08-2020</a:t>
             </a:fld>
             <a:endParaRPr lang="en-IN"/>
           </a:p>
@@ -2508,7 +2530,7 @@
           <a:p>
             <a:fld id="{AD33674F-65ED-4590-818F-BC6276B1D5DF}" type="datetimeFigureOut">
               <a:rPr lang="en-IN" smtClean="0"/>
-              <a:t>28-08-2020</a:t>
+              <a:t>29-08-2020</a:t>
             </a:fld>
             <a:endParaRPr lang="en-IN"/>
           </a:p>
@@ -2721,7 +2743,7 @@
           <a:p>
             <a:fld id="{AD33674F-65ED-4590-818F-BC6276B1D5DF}" type="datetimeFigureOut">
               <a:rPr lang="en-IN" smtClean="0"/>
-              <a:t>28-08-2020</a:t>
+              <a:t>29-08-2020</a:t>
             </a:fld>
             <a:endParaRPr lang="en-IN"/>
           </a:p>
@@ -3157,6 +3179,964 @@
 </p:sld>
 </file>
 
+<file path=ppt/slides/slide10.xml><?xml version="1.0" encoding="utf-8"?>
+<p:sld xmlns:a="http://schemas.openxmlformats.org/drawingml/2006/main" xmlns:r="http://schemas.openxmlformats.org/officeDocument/2006/relationships" xmlns:p="http://schemas.openxmlformats.org/presentationml/2006/main">
+  <p:cSld>
+    <p:spTree>
+      <p:nvGrpSpPr>
+        <p:cNvPr id="1" name=""/>
+        <p:cNvGrpSpPr/>
+        <p:nvPr/>
+      </p:nvGrpSpPr>
+      <p:grpSpPr>
+        <a:xfrm>
+          <a:off x="0" y="0"/>
+          <a:ext cx="0" cy="0"/>
+          <a:chOff x="0" y="0"/>
+          <a:chExt cx="0" cy="0"/>
+        </a:xfrm>
+      </p:grpSpPr>
+      <p:sp>
+        <p:nvSpPr>
+          <p:cNvPr id="2" name="Title 1"/>
+          <p:cNvSpPr>
+            <a:spLocks noGrp="1"/>
+          </p:cNvSpPr>
+          <p:nvPr>
+            <p:ph type="title"/>
+          </p:nvPr>
+        </p:nvSpPr>
+        <p:spPr/>
+        <p:txBody>
+          <a:bodyPr/>
+          <a:lstStyle/>
+          <a:p>
+            <a:r>
+              <a:rPr lang="en-US" dirty="0" smtClean="0"/>
+              <a:t>Data preparation</a:t>
+            </a:r>
+            <a:endParaRPr lang="en-IN" dirty="0"/>
+          </a:p>
+        </p:txBody>
+      </p:sp>
+      <p:sp>
+        <p:nvSpPr>
+          <p:cNvPr id="3" name="Content Placeholder 2"/>
+          <p:cNvSpPr>
+            <a:spLocks noGrp="1"/>
+          </p:cNvSpPr>
+          <p:nvPr>
+            <p:ph idx="1"/>
+          </p:nvPr>
+        </p:nvSpPr>
+        <p:spPr/>
+        <p:txBody>
+          <a:bodyPr/>
+          <a:lstStyle/>
+          <a:p>
+            <a:endParaRPr lang="en-IN" dirty="0" smtClean="0"/>
+          </a:p>
+          <a:p>
+            <a:r>
+              <a:rPr lang="en-IN" dirty="0" smtClean="0"/>
+              <a:t>To </a:t>
+            </a:r>
+            <a:r>
+              <a:rPr lang="en-IN" dirty="0"/>
+              <a:t>be able to answer our primary question, we need to restructure the data(which is mainly in the form of words and strings, to a numeric format so that it can be used by the machine learning model.</a:t>
+            </a:r>
+          </a:p>
+          <a:p>
+            <a:endParaRPr lang="en-IN" dirty="0"/>
+          </a:p>
+        </p:txBody>
+      </p:sp>
+    </p:spTree>
+    <p:extLst>
+      <p:ext uri="{BB962C8B-B14F-4D97-AF65-F5344CB8AC3E}">
+        <p14:creationId xmlns:p14="http://schemas.microsoft.com/office/powerpoint/2010/main" val="467813862"/>
+      </p:ext>
+    </p:extLst>
+  </p:cSld>
+  <p:clrMapOvr>
+    <a:masterClrMapping/>
+  </p:clrMapOvr>
+  <p:timing>
+    <p:tnLst>
+      <p:par>
+        <p:cTn id="1" dur="indefinite" restart="never" nodeType="tmRoot"/>
+      </p:par>
+    </p:tnLst>
+  </p:timing>
+</p:sld>
+</file>
+
+<file path=ppt/slides/slide11.xml><?xml version="1.0" encoding="utf-8"?>
+<p:sld xmlns:a="http://schemas.openxmlformats.org/drawingml/2006/main" xmlns:r="http://schemas.openxmlformats.org/officeDocument/2006/relationships" xmlns:p="http://schemas.openxmlformats.org/presentationml/2006/main">
+  <p:cSld>
+    <p:spTree>
+      <p:nvGrpSpPr>
+        <p:cNvPr id="1" name=""/>
+        <p:cNvGrpSpPr/>
+        <p:nvPr/>
+      </p:nvGrpSpPr>
+      <p:grpSpPr>
+        <a:xfrm>
+          <a:off x="0" y="0"/>
+          <a:ext cx="0" cy="0"/>
+          <a:chOff x="0" y="0"/>
+          <a:chExt cx="0" cy="0"/>
+        </a:xfrm>
+      </p:grpSpPr>
+      <p:sp>
+        <p:nvSpPr>
+          <p:cNvPr id="2" name="Title 1"/>
+          <p:cNvSpPr>
+            <a:spLocks noGrp="1"/>
+          </p:cNvSpPr>
+          <p:nvPr>
+            <p:ph type="title"/>
+          </p:nvPr>
+        </p:nvSpPr>
+        <p:spPr/>
+        <p:txBody>
+          <a:bodyPr/>
+          <a:lstStyle/>
+          <a:p>
+            <a:r>
+              <a:rPr lang="en-US" dirty="0" smtClean="0"/>
+              <a:t>Data preparation</a:t>
+            </a:r>
+            <a:endParaRPr lang="en-IN" dirty="0"/>
+          </a:p>
+        </p:txBody>
+      </p:sp>
+      <p:sp>
+        <p:nvSpPr>
+          <p:cNvPr id="3" name="Content Placeholder 2"/>
+          <p:cNvSpPr>
+            <a:spLocks noGrp="1"/>
+          </p:cNvSpPr>
+          <p:nvPr>
+            <p:ph idx="1"/>
+          </p:nvPr>
+        </p:nvSpPr>
+        <p:spPr/>
+        <p:txBody>
+          <a:bodyPr/>
+          <a:lstStyle/>
+          <a:p>
+            <a:r>
+              <a:rPr lang="en-IN" dirty="0"/>
+              <a:t>Let’s first have a look at what the data looks like in its raw form:</a:t>
+            </a:r>
+          </a:p>
+          <a:p>
+            <a:endParaRPr lang="en-IN" dirty="0"/>
+          </a:p>
+        </p:txBody>
+      </p:sp>
+      <p:pic>
+        <p:nvPicPr>
+          <p:cNvPr id="4" name="Picture 3"/>
+          <p:cNvPicPr/>
+          <p:nvPr/>
+        </p:nvPicPr>
+        <p:blipFill>
+          <a:blip r:embed="rId2"/>
+          <a:stretch>
+            <a:fillRect/>
+          </a:stretch>
+        </p:blipFill>
+        <p:spPr>
+          <a:xfrm>
+            <a:off x="395536" y="2780928"/>
+            <a:ext cx="8280920" cy="2736304"/>
+          </a:xfrm>
+          <a:prstGeom prst="rect">
+            <a:avLst/>
+          </a:prstGeom>
+        </p:spPr>
+      </p:pic>
+    </p:spTree>
+    <p:extLst>
+      <p:ext uri="{BB962C8B-B14F-4D97-AF65-F5344CB8AC3E}">
+        <p14:creationId xmlns:p14="http://schemas.microsoft.com/office/powerpoint/2010/main" val="963799371"/>
+      </p:ext>
+    </p:extLst>
+  </p:cSld>
+  <p:clrMapOvr>
+    <a:masterClrMapping/>
+  </p:clrMapOvr>
+  <p:timing>
+    <p:tnLst>
+      <p:par>
+        <p:cTn id="1" dur="indefinite" restart="never" nodeType="tmRoot"/>
+      </p:par>
+    </p:tnLst>
+  </p:timing>
+</p:sld>
+</file>
+
+<file path=ppt/slides/slide12.xml><?xml version="1.0" encoding="utf-8"?>
+<p:sld xmlns:a="http://schemas.openxmlformats.org/drawingml/2006/main" xmlns:r="http://schemas.openxmlformats.org/officeDocument/2006/relationships" xmlns:p="http://schemas.openxmlformats.org/presentationml/2006/main">
+  <p:cSld>
+    <p:spTree>
+      <p:nvGrpSpPr>
+        <p:cNvPr id="1" name=""/>
+        <p:cNvGrpSpPr/>
+        <p:nvPr/>
+      </p:nvGrpSpPr>
+      <p:grpSpPr>
+        <a:xfrm>
+          <a:off x="0" y="0"/>
+          <a:ext cx="0" cy="0"/>
+          <a:chOff x="0" y="0"/>
+          <a:chExt cx="0" cy="0"/>
+        </a:xfrm>
+      </p:grpSpPr>
+      <p:sp>
+        <p:nvSpPr>
+          <p:cNvPr id="2" name="Title 1"/>
+          <p:cNvSpPr>
+            <a:spLocks noGrp="1"/>
+          </p:cNvSpPr>
+          <p:nvPr>
+            <p:ph type="title"/>
+          </p:nvPr>
+        </p:nvSpPr>
+        <p:spPr/>
+        <p:txBody>
+          <a:bodyPr/>
+          <a:lstStyle/>
+          <a:p>
+            <a:r>
+              <a:rPr lang="en-US" dirty="0" smtClean="0"/>
+              <a:t>Data Preparation</a:t>
+            </a:r>
+            <a:endParaRPr lang="en-IN" dirty="0"/>
+          </a:p>
+        </p:txBody>
+      </p:sp>
+      <p:sp>
+        <p:nvSpPr>
+          <p:cNvPr id="3" name="Content Placeholder 2"/>
+          <p:cNvSpPr>
+            <a:spLocks noGrp="1"/>
+          </p:cNvSpPr>
+          <p:nvPr>
+            <p:ph idx="1"/>
+          </p:nvPr>
+        </p:nvSpPr>
+        <p:spPr/>
+        <p:txBody>
+          <a:bodyPr/>
+          <a:lstStyle/>
+          <a:p>
+            <a:r>
+              <a:rPr lang="en-IN" dirty="0"/>
+              <a:t>We are mainly interested in the </a:t>
+            </a:r>
+            <a:r>
+              <a:rPr lang="en-IN" dirty="0" err="1"/>
+              <a:t>userID,venueCategory</a:t>
+            </a:r>
+            <a:r>
+              <a:rPr lang="en-IN" dirty="0"/>
+              <a:t>, </a:t>
+            </a:r>
+            <a:r>
+              <a:rPr lang="en-IN" dirty="0" err="1"/>
+              <a:t>utcTimestamp</a:t>
+            </a:r>
+            <a:r>
+              <a:rPr lang="en-IN" dirty="0"/>
+              <a:t>, latitude and longitude columns.</a:t>
+            </a:r>
+          </a:p>
+          <a:p>
+            <a:r>
+              <a:rPr lang="en-IN" dirty="0"/>
+              <a:t>But to work with date-times, we first need to convert the timestamp to a date-time object.</a:t>
+            </a:r>
+          </a:p>
+          <a:p>
+            <a:r>
+              <a:rPr lang="en-IN" dirty="0"/>
+              <a:t>We convert the given column and it gives the following </a:t>
+            </a:r>
+            <a:r>
+              <a:rPr lang="en-IN" dirty="0" err="1"/>
+              <a:t>dataframe</a:t>
+            </a:r>
+            <a:r>
+              <a:rPr lang="en-IN" dirty="0"/>
+              <a:t>:</a:t>
+            </a:r>
+          </a:p>
+          <a:p>
+            <a:endParaRPr lang="en-IN" dirty="0"/>
+          </a:p>
+        </p:txBody>
+      </p:sp>
+    </p:spTree>
+    <p:extLst>
+      <p:ext uri="{BB962C8B-B14F-4D97-AF65-F5344CB8AC3E}">
+        <p14:creationId xmlns:p14="http://schemas.microsoft.com/office/powerpoint/2010/main" val="3149303459"/>
+      </p:ext>
+    </p:extLst>
+  </p:cSld>
+  <p:clrMapOvr>
+    <a:masterClrMapping/>
+  </p:clrMapOvr>
+</p:sld>
+</file>
+
+<file path=ppt/slides/slide13.xml><?xml version="1.0" encoding="utf-8"?>
+<p:sld xmlns:a="http://schemas.openxmlformats.org/drawingml/2006/main" xmlns:r="http://schemas.openxmlformats.org/officeDocument/2006/relationships" xmlns:p="http://schemas.openxmlformats.org/presentationml/2006/main">
+  <p:cSld>
+    <p:spTree>
+      <p:nvGrpSpPr>
+        <p:cNvPr id="1" name=""/>
+        <p:cNvGrpSpPr/>
+        <p:nvPr/>
+      </p:nvGrpSpPr>
+      <p:grpSpPr>
+        <a:xfrm>
+          <a:off x="0" y="0"/>
+          <a:ext cx="0" cy="0"/>
+          <a:chOff x="0" y="0"/>
+          <a:chExt cx="0" cy="0"/>
+        </a:xfrm>
+      </p:grpSpPr>
+      <p:sp>
+        <p:nvSpPr>
+          <p:cNvPr id="2" name="Title 1"/>
+          <p:cNvSpPr>
+            <a:spLocks noGrp="1"/>
+          </p:cNvSpPr>
+          <p:nvPr>
+            <p:ph type="title"/>
+          </p:nvPr>
+        </p:nvSpPr>
+        <p:spPr/>
+        <p:txBody>
+          <a:bodyPr/>
+          <a:lstStyle/>
+          <a:p>
+            <a:r>
+              <a:rPr lang="en-US" dirty="0" smtClean="0"/>
+              <a:t>Data Preparation</a:t>
+            </a:r>
+            <a:endParaRPr lang="en-IN" dirty="0"/>
+          </a:p>
+        </p:txBody>
+      </p:sp>
+      <p:pic>
+        <p:nvPicPr>
+          <p:cNvPr id="4" name="Content Placeholder 3"/>
+          <p:cNvPicPr>
+            <a:picLocks noGrp="1"/>
+          </p:cNvPicPr>
+          <p:nvPr>
+            <p:ph idx="1"/>
+          </p:nvPr>
+        </p:nvPicPr>
+        <p:blipFill>
+          <a:blip r:embed="rId2"/>
+          <a:stretch>
+            <a:fillRect/>
+          </a:stretch>
+        </p:blipFill>
+        <p:spPr>
+          <a:xfrm>
+            <a:off x="457200" y="2311700"/>
+            <a:ext cx="8229600" cy="3102963"/>
+          </a:xfrm>
+          <a:prstGeom prst="rect">
+            <a:avLst/>
+          </a:prstGeom>
+        </p:spPr>
+      </p:pic>
+    </p:spTree>
+    <p:extLst>
+      <p:ext uri="{BB962C8B-B14F-4D97-AF65-F5344CB8AC3E}">
+        <p14:creationId xmlns:p14="http://schemas.microsoft.com/office/powerpoint/2010/main" val="1008719612"/>
+      </p:ext>
+    </p:extLst>
+  </p:cSld>
+  <p:clrMapOvr>
+    <a:masterClrMapping/>
+  </p:clrMapOvr>
+</p:sld>
+</file>
+
+<file path=ppt/slides/slide14.xml><?xml version="1.0" encoding="utf-8"?>
+<p:sld xmlns:a="http://schemas.openxmlformats.org/drawingml/2006/main" xmlns:r="http://schemas.openxmlformats.org/officeDocument/2006/relationships" xmlns:p="http://schemas.openxmlformats.org/presentationml/2006/main">
+  <p:cSld>
+    <p:spTree>
+      <p:nvGrpSpPr>
+        <p:cNvPr id="1" name=""/>
+        <p:cNvGrpSpPr/>
+        <p:nvPr/>
+      </p:nvGrpSpPr>
+      <p:grpSpPr>
+        <a:xfrm>
+          <a:off x="0" y="0"/>
+          <a:ext cx="0" cy="0"/>
+          <a:chOff x="0" y="0"/>
+          <a:chExt cx="0" cy="0"/>
+        </a:xfrm>
+      </p:grpSpPr>
+      <p:sp>
+        <p:nvSpPr>
+          <p:cNvPr id="2" name="Title 1"/>
+          <p:cNvSpPr>
+            <a:spLocks noGrp="1"/>
+          </p:cNvSpPr>
+          <p:nvPr>
+            <p:ph type="title"/>
+          </p:nvPr>
+        </p:nvSpPr>
+        <p:spPr/>
+        <p:txBody>
+          <a:bodyPr/>
+          <a:lstStyle/>
+          <a:p>
+            <a:r>
+              <a:rPr lang="en-US" dirty="0" smtClean="0"/>
+              <a:t>Data Preparation</a:t>
+            </a:r>
+            <a:endParaRPr lang="en-IN" dirty="0"/>
+          </a:p>
+        </p:txBody>
+      </p:sp>
+      <p:sp>
+        <p:nvSpPr>
+          <p:cNvPr id="3" name="Content Placeholder 2"/>
+          <p:cNvSpPr>
+            <a:spLocks noGrp="1"/>
+          </p:cNvSpPr>
+          <p:nvPr>
+            <p:ph idx="1"/>
+          </p:nvPr>
+        </p:nvSpPr>
+        <p:spPr/>
+        <p:txBody>
+          <a:bodyPr/>
+          <a:lstStyle/>
+          <a:p>
+            <a:endParaRPr lang="en-IN" dirty="0" smtClean="0"/>
+          </a:p>
+          <a:p>
+            <a:r>
+              <a:rPr lang="en-IN" dirty="0" smtClean="0"/>
+              <a:t>We </a:t>
+            </a:r>
+            <a:r>
+              <a:rPr lang="en-IN" dirty="0"/>
+              <a:t>have 251 unique categories of venues for the new york dataset, so we create one-hot encodings for each, group them by the 1083 unique users and average the encodings.</a:t>
+            </a:r>
+          </a:p>
+          <a:p>
+            <a:endParaRPr lang="en-IN" dirty="0"/>
+          </a:p>
+        </p:txBody>
+      </p:sp>
+    </p:spTree>
+    <p:extLst>
+      <p:ext uri="{BB962C8B-B14F-4D97-AF65-F5344CB8AC3E}">
+        <p14:creationId xmlns:p14="http://schemas.microsoft.com/office/powerpoint/2010/main" val="2780015962"/>
+      </p:ext>
+    </p:extLst>
+  </p:cSld>
+  <p:clrMapOvr>
+    <a:masterClrMapping/>
+  </p:clrMapOvr>
+</p:sld>
+</file>
+
+<file path=ppt/slides/slide15.xml><?xml version="1.0" encoding="utf-8"?>
+<p:sld xmlns:a="http://schemas.openxmlformats.org/drawingml/2006/main" xmlns:r="http://schemas.openxmlformats.org/officeDocument/2006/relationships" xmlns:p="http://schemas.openxmlformats.org/presentationml/2006/main">
+  <p:cSld>
+    <p:spTree>
+      <p:nvGrpSpPr>
+        <p:cNvPr id="1" name=""/>
+        <p:cNvGrpSpPr/>
+        <p:nvPr/>
+      </p:nvGrpSpPr>
+      <p:grpSpPr>
+        <a:xfrm>
+          <a:off x="0" y="0"/>
+          <a:ext cx="0" cy="0"/>
+          <a:chOff x="0" y="0"/>
+          <a:chExt cx="0" cy="0"/>
+        </a:xfrm>
+      </p:grpSpPr>
+      <p:sp>
+        <p:nvSpPr>
+          <p:cNvPr id="2" name="Title 1"/>
+          <p:cNvSpPr>
+            <a:spLocks noGrp="1"/>
+          </p:cNvSpPr>
+          <p:nvPr>
+            <p:ph type="title"/>
+          </p:nvPr>
+        </p:nvSpPr>
+        <p:spPr/>
+        <p:txBody>
+          <a:bodyPr/>
+          <a:lstStyle/>
+          <a:p>
+            <a:r>
+              <a:rPr lang="en-US" dirty="0" smtClean="0"/>
+              <a:t>Data preparation</a:t>
+            </a:r>
+            <a:endParaRPr lang="en-IN" dirty="0"/>
+          </a:p>
+        </p:txBody>
+      </p:sp>
+      <p:sp>
+        <p:nvSpPr>
+          <p:cNvPr id="3" name="Content Placeholder 2"/>
+          <p:cNvSpPr>
+            <a:spLocks noGrp="1"/>
+          </p:cNvSpPr>
+          <p:nvPr>
+            <p:ph idx="1"/>
+          </p:nvPr>
+        </p:nvSpPr>
+        <p:spPr/>
+        <p:txBody>
+          <a:bodyPr/>
+          <a:lstStyle/>
+          <a:p>
+            <a:r>
+              <a:rPr lang="en-IN" dirty="0"/>
+              <a:t>After the above mentioned steps, we get a </a:t>
+            </a:r>
+            <a:r>
+              <a:rPr lang="en-IN" dirty="0" err="1"/>
+              <a:t>dataframe</a:t>
+            </a:r>
+            <a:r>
+              <a:rPr lang="en-IN" dirty="0"/>
+              <a:t> that looks like this: </a:t>
+            </a:r>
+            <a:endParaRPr lang="en-IN" dirty="0" smtClean="0"/>
+          </a:p>
+          <a:p>
+            <a:endParaRPr lang="en-IN" dirty="0" smtClean="0"/>
+          </a:p>
+          <a:p>
+            <a:endParaRPr lang="en-IN" dirty="0" smtClean="0"/>
+          </a:p>
+          <a:p>
+            <a:endParaRPr lang="en-IN" dirty="0"/>
+          </a:p>
+          <a:p>
+            <a:endParaRPr lang="en-IN" dirty="0" smtClean="0"/>
+          </a:p>
+          <a:p>
+            <a:r>
+              <a:rPr lang="en-IN" dirty="0" smtClean="0"/>
+              <a:t>Now </a:t>
+            </a:r>
+            <a:r>
+              <a:rPr lang="en-IN" dirty="0"/>
+              <a:t>our data is perfectly formatted for the next step, i.e. Clustering of users.</a:t>
+            </a:r>
+          </a:p>
+          <a:p>
+            <a:endParaRPr lang="en-IN" dirty="0"/>
+          </a:p>
+        </p:txBody>
+      </p:sp>
+      <p:pic>
+        <p:nvPicPr>
+          <p:cNvPr id="4" name="Picture 3"/>
+          <p:cNvPicPr/>
+          <p:nvPr/>
+        </p:nvPicPr>
+        <p:blipFill>
+          <a:blip r:embed="rId2"/>
+          <a:stretch>
+            <a:fillRect/>
+          </a:stretch>
+        </p:blipFill>
+        <p:spPr>
+          <a:xfrm>
+            <a:off x="755576" y="2768864"/>
+            <a:ext cx="7920880" cy="2244312"/>
+          </a:xfrm>
+          <a:prstGeom prst="rect">
+            <a:avLst/>
+          </a:prstGeom>
+        </p:spPr>
+      </p:pic>
+    </p:spTree>
+    <p:extLst>
+      <p:ext uri="{BB962C8B-B14F-4D97-AF65-F5344CB8AC3E}">
+        <p14:creationId xmlns:p14="http://schemas.microsoft.com/office/powerpoint/2010/main" val="509321904"/>
+      </p:ext>
+    </p:extLst>
+  </p:cSld>
+  <p:clrMapOvr>
+    <a:masterClrMapping/>
+  </p:clrMapOvr>
+</p:sld>
+</file>
+
+<file path=ppt/slides/slide16.xml><?xml version="1.0" encoding="utf-8"?>
+<p:sld xmlns:a="http://schemas.openxmlformats.org/drawingml/2006/main" xmlns:r="http://schemas.openxmlformats.org/officeDocument/2006/relationships" xmlns:p="http://schemas.openxmlformats.org/presentationml/2006/main">
+  <p:cSld>
+    <p:spTree>
+      <p:nvGrpSpPr>
+        <p:cNvPr id="1" name=""/>
+        <p:cNvGrpSpPr/>
+        <p:nvPr/>
+      </p:nvGrpSpPr>
+      <p:grpSpPr>
+        <a:xfrm>
+          <a:off x="0" y="0"/>
+          <a:ext cx="0" cy="0"/>
+          <a:chOff x="0" y="0"/>
+          <a:chExt cx="0" cy="0"/>
+        </a:xfrm>
+      </p:grpSpPr>
+      <p:sp>
+        <p:nvSpPr>
+          <p:cNvPr id="2" name="Title 1"/>
+          <p:cNvSpPr>
+            <a:spLocks noGrp="1"/>
+          </p:cNvSpPr>
+          <p:nvPr>
+            <p:ph type="title"/>
+          </p:nvPr>
+        </p:nvSpPr>
+        <p:spPr/>
+        <p:txBody>
+          <a:bodyPr/>
+          <a:lstStyle/>
+          <a:p>
+            <a:r>
+              <a:rPr lang="en-US" dirty="0" smtClean="0"/>
+              <a:t>Clustering of users</a:t>
+            </a:r>
+            <a:endParaRPr lang="en-IN" dirty="0"/>
+          </a:p>
+        </p:txBody>
+      </p:sp>
+      <p:sp>
+        <p:nvSpPr>
+          <p:cNvPr id="3" name="Content Placeholder 2"/>
+          <p:cNvSpPr>
+            <a:spLocks noGrp="1"/>
+          </p:cNvSpPr>
+          <p:nvPr>
+            <p:ph idx="1"/>
+          </p:nvPr>
+        </p:nvSpPr>
+        <p:spPr/>
+        <p:txBody>
+          <a:bodyPr/>
+          <a:lstStyle/>
+          <a:p>
+            <a:endParaRPr lang="en-IN" dirty="0" smtClean="0"/>
+          </a:p>
+          <a:p>
+            <a:r>
+              <a:rPr lang="en-IN" dirty="0" smtClean="0"/>
+              <a:t>Using </a:t>
+            </a:r>
+            <a:r>
+              <a:rPr lang="en-IN" dirty="0"/>
+              <a:t>the now structured data to cluster the users based on their frequency of visits to particular locations into 10 unique clusters.</a:t>
+            </a:r>
+          </a:p>
+          <a:p>
+            <a:r>
+              <a:rPr lang="en-IN" dirty="0"/>
+              <a:t>For this purpose we use the classic algorithm k-means.</a:t>
+            </a:r>
+            <a:endParaRPr lang="en-IN" dirty="0"/>
+          </a:p>
+        </p:txBody>
+      </p:sp>
+    </p:spTree>
+    <p:extLst>
+      <p:ext uri="{BB962C8B-B14F-4D97-AF65-F5344CB8AC3E}">
+        <p14:creationId xmlns:p14="http://schemas.microsoft.com/office/powerpoint/2010/main" val="1076325126"/>
+      </p:ext>
+    </p:extLst>
+  </p:cSld>
+  <p:clrMapOvr>
+    <a:masterClrMapping/>
+  </p:clrMapOvr>
+</p:sld>
+</file>
+
+<file path=ppt/slides/slide17.xml><?xml version="1.0" encoding="utf-8"?>
+<p:sld xmlns:a="http://schemas.openxmlformats.org/drawingml/2006/main" xmlns:r="http://schemas.openxmlformats.org/officeDocument/2006/relationships" xmlns:p="http://schemas.openxmlformats.org/presentationml/2006/main">
+  <p:cSld>
+    <p:spTree>
+      <p:nvGrpSpPr>
+        <p:cNvPr id="1" name=""/>
+        <p:cNvGrpSpPr/>
+        <p:nvPr/>
+      </p:nvGrpSpPr>
+      <p:grpSpPr>
+        <a:xfrm>
+          <a:off x="0" y="0"/>
+          <a:ext cx="0" cy="0"/>
+          <a:chOff x="0" y="0"/>
+          <a:chExt cx="0" cy="0"/>
+        </a:xfrm>
+      </p:grpSpPr>
+      <p:sp>
+        <p:nvSpPr>
+          <p:cNvPr id="2" name="Title 1"/>
+          <p:cNvSpPr>
+            <a:spLocks noGrp="1"/>
+          </p:cNvSpPr>
+          <p:nvPr>
+            <p:ph type="title"/>
+          </p:nvPr>
+        </p:nvSpPr>
+        <p:spPr/>
+        <p:txBody>
+          <a:bodyPr/>
+          <a:lstStyle/>
+          <a:p>
+            <a:r>
+              <a:rPr lang="en-US" dirty="0"/>
+              <a:t>Clustering of users</a:t>
+            </a:r>
+            <a:endParaRPr lang="en-IN" dirty="0"/>
+          </a:p>
+        </p:txBody>
+      </p:sp>
+      <p:sp>
+        <p:nvSpPr>
+          <p:cNvPr id="3" name="Content Placeholder 2"/>
+          <p:cNvSpPr>
+            <a:spLocks noGrp="1"/>
+          </p:cNvSpPr>
+          <p:nvPr>
+            <p:ph idx="1"/>
+          </p:nvPr>
+        </p:nvSpPr>
+        <p:spPr/>
+        <p:txBody>
+          <a:bodyPr/>
+          <a:lstStyle/>
+          <a:p>
+            <a:pPr marL="0" indent="0">
+              <a:buNone/>
+            </a:pPr>
+            <a:endParaRPr lang="en-IN" dirty="0" smtClean="0"/>
+          </a:p>
+          <a:p>
+            <a:pPr marL="0" indent="0">
+              <a:buNone/>
+            </a:pPr>
+            <a:r>
+              <a:rPr lang="en-IN" dirty="0" smtClean="0"/>
+              <a:t>k-means </a:t>
+            </a:r>
+            <a:r>
+              <a:rPr lang="en-IN" dirty="0"/>
+              <a:t>clustering is a method of vector quantization, originally from signal processing, that aims to partition n observations into k clusters in which each observation belongs to the cluster with the nearest mean (cluster </a:t>
+            </a:r>
+            <a:r>
+              <a:rPr lang="en-IN" dirty="0" err="1"/>
+              <a:t>centers</a:t>
+            </a:r>
+            <a:r>
+              <a:rPr lang="en-IN" dirty="0"/>
+              <a:t> or cluster centroid), serving as a prototype of the cluster.</a:t>
+            </a:r>
+          </a:p>
+          <a:p>
+            <a:endParaRPr lang="en-IN" dirty="0"/>
+          </a:p>
+        </p:txBody>
+      </p:sp>
+    </p:spTree>
+    <p:extLst>
+      <p:ext uri="{BB962C8B-B14F-4D97-AF65-F5344CB8AC3E}">
+        <p14:creationId xmlns:p14="http://schemas.microsoft.com/office/powerpoint/2010/main" val="3410587947"/>
+      </p:ext>
+    </p:extLst>
+  </p:cSld>
+  <p:clrMapOvr>
+    <a:masterClrMapping/>
+  </p:clrMapOvr>
+</p:sld>
+</file>
+
+<file path=ppt/slides/slide18.xml><?xml version="1.0" encoding="utf-8"?>
+<p:sld xmlns:a="http://schemas.openxmlformats.org/drawingml/2006/main" xmlns:r="http://schemas.openxmlformats.org/officeDocument/2006/relationships" xmlns:p="http://schemas.openxmlformats.org/presentationml/2006/main">
+  <p:cSld>
+    <p:spTree>
+      <p:nvGrpSpPr>
+        <p:cNvPr id="1" name=""/>
+        <p:cNvGrpSpPr/>
+        <p:nvPr/>
+      </p:nvGrpSpPr>
+      <p:grpSpPr>
+        <a:xfrm>
+          <a:off x="0" y="0"/>
+          <a:ext cx="0" cy="0"/>
+          <a:chOff x="0" y="0"/>
+          <a:chExt cx="0" cy="0"/>
+        </a:xfrm>
+      </p:grpSpPr>
+      <p:sp>
+        <p:nvSpPr>
+          <p:cNvPr id="2" name="Title 1"/>
+          <p:cNvSpPr>
+            <a:spLocks noGrp="1"/>
+          </p:cNvSpPr>
+          <p:nvPr>
+            <p:ph type="title"/>
+          </p:nvPr>
+        </p:nvSpPr>
+        <p:spPr/>
+        <p:txBody>
+          <a:bodyPr/>
+          <a:lstStyle/>
+          <a:p>
+            <a:r>
+              <a:rPr lang="en-US" dirty="0"/>
+              <a:t>Clustering of users</a:t>
+            </a:r>
+            <a:endParaRPr lang="en-IN" dirty="0"/>
+          </a:p>
+        </p:txBody>
+      </p:sp>
+      <p:sp>
+        <p:nvSpPr>
+          <p:cNvPr id="3" name="Content Placeholder 2"/>
+          <p:cNvSpPr>
+            <a:spLocks noGrp="1"/>
+          </p:cNvSpPr>
+          <p:nvPr>
+            <p:ph idx="1"/>
+          </p:nvPr>
+        </p:nvSpPr>
+        <p:spPr/>
+        <p:txBody>
+          <a:bodyPr/>
+          <a:lstStyle/>
+          <a:p>
+            <a:r>
+              <a:rPr lang="en-IN" dirty="0"/>
+              <a:t>After clustering, we get a set of labels between 0 and 9(inclusive) for each user which we then assign to the respective users. </a:t>
+            </a:r>
+          </a:p>
+          <a:p>
+            <a:r>
+              <a:rPr lang="en-IN" dirty="0"/>
+              <a:t>For simplicity, we also filter out the top ten visited places by the users so as to reduce non-essential features.</a:t>
+            </a:r>
+          </a:p>
+          <a:p>
+            <a:endParaRPr lang="en-IN" dirty="0"/>
+          </a:p>
+        </p:txBody>
+      </p:sp>
+    </p:spTree>
+    <p:extLst>
+      <p:ext uri="{BB962C8B-B14F-4D97-AF65-F5344CB8AC3E}">
+        <p14:creationId xmlns:p14="http://schemas.microsoft.com/office/powerpoint/2010/main" val="2273319597"/>
+      </p:ext>
+    </p:extLst>
+  </p:cSld>
+  <p:clrMapOvr>
+    <a:masterClrMapping/>
+  </p:clrMapOvr>
+</p:sld>
+</file>
+
+<file path=ppt/slides/slide19.xml><?xml version="1.0" encoding="utf-8"?>
+<p:sld xmlns:a="http://schemas.openxmlformats.org/drawingml/2006/main" xmlns:r="http://schemas.openxmlformats.org/officeDocument/2006/relationships" xmlns:p="http://schemas.openxmlformats.org/presentationml/2006/main">
+  <p:cSld>
+    <p:spTree>
+      <p:nvGrpSpPr>
+        <p:cNvPr id="1" name=""/>
+        <p:cNvGrpSpPr/>
+        <p:nvPr/>
+      </p:nvGrpSpPr>
+      <p:grpSpPr>
+        <a:xfrm>
+          <a:off x="0" y="0"/>
+          <a:ext cx="0" cy="0"/>
+          <a:chOff x="0" y="0"/>
+          <a:chExt cx="0" cy="0"/>
+        </a:xfrm>
+      </p:grpSpPr>
+      <p:sp>
+        <p:nvSpPr>
+          <p:cNvPr id="2" name="Title 1"/>
+          <p:cNvSpPr>
+            <a:spLocks noGrp="1"/>
+          </p:cNvSpPr>
+          <p:nvPr>
+            <p:ph type="title"/>
+          </p:nvPr>
+        </p:nvSpPr>
+        <p:spPr/>
+        <p:txBody>
+          <a:bodyPr/>
+          <a:lstStyle/>
+          <a:p>
+            <a:r>
+              <a:rPr lang="en-US" dirty="0"/>
+              <a:t>Clustering of users</a:t>
+            </a:r>
+            <a:endParaRPr lang="en-IN" dirty="0"/>
+          </a:p>
+        </p:txBody>
+      </p:sp>
+      <p:sp>
+        <p:nvSpPr>
+          <p:cNvPr id="3" name="Content Placeholder 2"/>
+          <p:cNvSpPr>
+            <a:spLocks noGrp="1"/>
+          </p:cNvSpPr>
+          <p:nvPr>
+            <p:ph idx="1"/>
+          </p:nvPr>
+        </p:nvSpPr>
+        <p:spPr/>
+        <p:txBody>
+          <a:bodyPr/>
+          <a:lstStyle/>
+          <a:p>
+            <a:r>
+              <a:rPr lang="en-IN" dirty="0"/>
+              <a:t>Now, armed with the most frequented places for each user and the clustered users, we find a pattern in each cluster and try to recommend to the users, similar places that have been frequented by others in their clusters.</a:t>
+            </a:r>
+          </a:p>
+          <a:p>
+            <a:endParaRPr lang="en-IN" dirty="0"/>
+          </a:p>
+        </p:txBody>
+      </p:sp>
+    </p:spTree>
+    <p:extLst>
+      <p:ext uri="{BB962C8B-B14F-4D97-AF65-F5344CB8AC3E}">
+        <p14:creationId xmlns:p14="http://schemas.microsoft.com/office/powerpoint/2010/main" val="1191175672"/>
+      </p:ext>
+    </p:extLst>
+  </p:cSld>
+  <p:clrMapOvr>
+    <a:masterClrMapping/>
+  </p:clrMapOvr>
+</p:sld>
+</file>
+
 <file path=ppt/slides/slide2.xml><?xml version="1.0" encoding="utf-8"?>
 <p:sld xmlns:a="http://schemas.openxmlformats.org/drawingml/2006/main" xmlns:r="http://schemas.openxmlformats.org/officeDocument/2006/relationships" xmlns:p="http://schemas.openxmlformats.org/presentationml/2006/main">
   <p:cSld>
@@ -3212,7 +4192,24 @@
           <a:bodyPr/>
           <a:lstStyle/>
           <a:p>
-            <a:endParaRPr lang="en-IN"/>
+            <a:r>
+              <a:rPr lang="en-US" dirty="0" smtClean="0"/>
+              <a:t>This project has aimed to answer the following question:</a:t>
+            </a:r>
+          </a:p>
+          <a:p>
+            <a:pPr lvl="1"/>
+            <a:r>
+              <a:rPr lang="en-IN" b="1" i="1" dirty="0"/>
+              <a:t>Given sets of location along with the type of location travelled to previously, what are the noteworthy locations that can be travelled to except past locations?</a:t>
+            </a:r>
+            <a:endParaRPr lang="en-IN" i="1" dirty="0"/>
+          </a:p>
+          <a:p>
+            <a:pPr marL="0" indent="0">
+              <a:buNone/>
+            </a:pPr>
+            <a:endParaRPr lang="en-IN" dirty="0"/>
           </a:p>
         </p:txBody>
       </p:sp>
@@ -3226,6 +4223,1321 @@
   <p:clrMapOvr>
     <a:masterClrMapping/>
   </p:clrMapOvr>
+</p:sld>
+</file>
+
+<file path=ppt/slides/slide20.xml><?xml version="1.0" encoding="utf-8"?>
+<p:sld xmlns:a="http://schemas.openxmlformats.org/drawingml/2006/main" xmlns:r="http://schemas.openxmlformats.org/officeDocument/2006/relationships" xmlns:p="http://schemas.openxmlformats.org/presentationml/2006/main">
+  <p:cSld>
+    <p:spTree>
+      <p:nvGrpSpPr>
+        <p:cNvPr id="1" name=""/>
+        <p:cNvGrpSpPr/>
+        <p:nvPr/>
+      </p:nvGrpSpPr>
+      <p:grpSpPr>
+        <a:xfrm>
+          <a:off x="0" y="0"/>
+          <a:ext cx="0" cy="0"/>
+          <a:chOff x="0" y="0"/>
+          <a:chExt cx="0" cy="0"/>
+        </a:xfrm>
+      </p:grpSpPr>
+      <p:sp>
+        <p:nvSpPr>
+          <p:cNvPr id="2" name="Title 1"/>
+          <p:cNvSpPr>
+            <a:spLocks noGrp="1"/>
+          </p:cNvSpPr>
+          <p:nvPr>
+            <p:ph type="title"/>
+          </p:nvPr>
+        </p:nvSpPr>
+        <p:spPr/>
+        <p:txBody>
+          <a:bodyPr/>
+          <a:lstStyle/>
+          <a:p>
+            <a:r>
+              <a:rPr lang="en-US" dirty="0" smtClean="0"/>
+              <a:t>Results</a:t>
+            </a:r>
+            <a:endParaRPr lang="en-IN" dirty="0"/>
+          </a:p>
+        </p:txBody>
+      </p:sp>
+      <p:sp>
+        <p:nvSpPr>
+          <p:cNvPr id="3" name="Content Placeholder 2"/>
+          <p:cNvSpPr>
+            <a:spLocks noGrp="1"/>
+          </p:cNvSpPr>
+          <p:nvPr>
+            <p:ph idx="1"/>
+          </p:nvPr>
+        </p:nvSpPr>
+        <p:spPr/>
+        <p:txBody>
+          <a:bodyPr/>
+          <a:lstStyle/>
+          <a:p>
+            <a:r>
+              <a:rPr lang="en-IN" dirty="0"/>
+              <a:t>After all the clustering and finding the most common places visited in a cluster, we filter out the places that the user has visited and map the top 10 visited places of each category by the same kind of users from the clusters, resulting in a map like this:</a:t>
+            </a:r>
+          </a:p>
+          <a:p>
+            <a:endParaRPr lang="en-IN" dirty="0"/>
+          </a:p>
+        </p:txBody>
+      </p:sp>
+    </p:spTree>
+    <p:extLst>
+      <p:ext uri="{BB962C8B-B14F-4D97-AF65-F5344CB8AC3E}">
+        <p14:creationId xmlns:p14="http://schemas.microsoft.com/office/powerpoint/2010/main" val="435595569"/>
+      </p:ext>
+    </p:extLst>
+  </p:cSld>
+  <p:clrMapOvr>
+    <a:masterClrMapping/>
+  </p:clrMapOvr>
+</p:sld>
+</file>
+
+<file path=ppt/slides/slide21.xml><?xml version="1.0" encoding="utf-8"?>
+<p:sld xmlns:a="http://schemas.openxmlformats.org/drawingml/2006/main" xmlns:r="http://schemas.openxmlformats.org/officeDocument/2006/relationships" xmlns:p="http://schemas.openxmlformats.org/presentationml/2006/main">
+  <p:cSld>
+    <p:spTree>
+      <p:nvGrpSpPr>
+        <p:cNvPr id="1" name=""/>
+        <p:cNvGrpSpPr/>
+        <p:nvPr/>
+      </p:nvGrpSpPr>
+      <p:grpSpPr>
+        <a:xfrm>
+          <a:off x="0" y="0"/>
+          <a:ext cx="0" cy="0"/>
+          <a:chOff x="0" y="0"/>
+          <a:chExt cx="0" cy="0"/>
+        </a:xfrm>
+      </p:grpSpPr>
+      <p:sp>
+        <p:nvSpPr>
+          <p:cNvPr id="2" name="Title 1"/>
+          <p:cNvSpPr>
+            <a:spLocks noGrp="1"/>
+          </p:cNvSpPr>
+          <p:nvPr>
+            <p:ph type="title"/>
+          </p:nvPr>
+        </p:nvSpPr>
+        <p:spPr/>
+        <p:txBody>
+          <a:bodyPr/>
+          <a:lstStyle/>
+          <a:p>
+            <a:r>
+              <a:rPr lang="en-US" dirty="0" smtClean="0"/>
+              <a:t>Results</a:t>
+            </a:r>
+            <a:endParaRPr lang="en-IN" dirty="0"/>
+          </a:p>
+        </p:txBody>
+      </p:sp>
+      <p:pic>
+        <p:nvPicPr>
+          <p:cNvPr id="4" name="Content Placeholder 3"/>
+          <p:cNvPicPr>
+            <a:picLocks noGrp="1"/>
+          </p:cNvPicPr>
+          <p:nvPr>
+            <p:ph idx="1"/>
+          </p:nvPr>
+        </p:nvPicPr>
+        <p:blipFill>
+          <a:blip r:embed="rId2"/>
+          <a:stretch>
+            <a:fillRect/>
+          </a:stretch>
+        </p:blipFill>
+        <p:spPr>
+          <a:xfrm>
+            <a:off x="457200" y="1821956"/>
+            <a:ext cx="8229600" cy="4082450"/>
+          </a:xfrm>
+          <a:prstGeom prst="rect">
+            <a:avLst/>
+          </a:prstGeom>
+        </p:spPr>
+      </p:pic>
+    </p:spTree>
+    <p:extLst>
+      <p:ext uri="{BB962C8B-B14F-4D97-AF65-F5344CB8AC3E}">
+        <p14:creationId xmlns:p14="http://schemas.microsoft.com/office/powerpoint/2010/main" val="2240064176"/>
+      </p:ext>
+    </p:extLst>
+  </p:cSld>
+  <p:clrMapOvr>
+    <a:masterClrMapping/>
+  </p:clrMapOvr>
+</p:sld>
+</file>
+
+<file path=ppt/slides/slide22.xml><?xml version="1.0" encoding="utf-8"?>
+<p:sld xmlns:a="http://schemas.openxmlformats.org/drawingml/2006/main" xmlns:r="http://schemas.openxmlformats.org/officeDocument/2006/relationships" xmlns:p="http://schemas.openxmlformats.org/presentationml/2006/main">
+  <p:cSld>
+    <p:spTree>
+      <p:nvGrpSpPr>
+        <p:cNvPr id="1" name=""/>
+        <p:cNvGrpSpPr/>
+        <p:nvPr/>
+      </p:nvGrpSpPr>
+      <p:grpSpPr>
+        <a:xfrm>
+          <a:off x="0" y="0"/>
+          <a:ext cx="0" cy="0"/>
+          <a:chOff x="0" y="0"/>
+          <a:chExt cx="0" cy="0"/>
+        </a:xfrm>
+      </p:grpSpPr>
+      <p:sp>
+        <p:nvSpPr>
+          <p:cNvPr id="2" name="Title 1"/>
+          <p:cNvSpPr>
+            <a:spLocks noGrp="1"/>
+          </p:cNvSpPr>
+          <p:nvPr>
+            <p:ph type="title"/>
+          </p:nvPr>
+        </p:nvSpPr>
+        <p:spPr/>
+        <p:txBody>
+          <a:bodyPr/>
+          <a:lstStyle/>
+          <a:p>
+            <a:r>
+              <a:rPr lang="en-US" dirty="0" smtClean="0"/>
+              <a:t>Results</a:t>
+            </a:r>
+            <a:endParaRPr lang="en-IN" dirty="0"/>
+          </a:p>
+        </p:txBody>
+      </p:sp>
+      <p:pic>
+        <p:nvPicPr>
+          <p:cNvPr id="4" name="Content Placeholder 3"/>
+          <p:cNvPicPr>
+            <a:picLocks noGrp="1"/>
+          </p:cNvPicPr>
+          <p:nvPr>
+            <p:ph idx="1"/>
+          </p:nvPr>
+        </p:nvPicPr>
+        <p:blipFill>
+          <a:blip r:embed="rId2"/>
+          <a:stretch>
+            <a:fillRect/>
+          </a:stretch>
+        </p:blipFill>
+        <p:spPr>
+          <a:xfrm>
+            <a:off x="395536" y="1484785"/>
+            <a:ext cx="8291264" cy="4636698"/>
+          </a:xfrm>
+          <a:prstGeom prst="rect">
+            <a:avLst/>
+          </a:prstGeom>
+        </p:spPr>
+      </p:pic>
+    </p:spTree>
+    <p:extLst>
+      <p:ext uri="{BB962C8B-B14F-4D97-AF65-F5344CB8AC3E}">
+        <p14:creationId xmlns:p14="http://schemas.microsoft.com/office/powerpoint/2010/main" val="83993210"/>
+      </p:ext>
+    </p:extLst>
+  </p:cSld>
+  <p:clrMapOvr>
+    <a:masterClrMapping/>
+  </p:clrMapOvr>
+</p:sld>
+</file>
+
+<file path=ppt/slides/slide23.xml><?xml version="1.0" encoding="utf-8"?>
+<p:sld xmlns:a="http://schemas.openxmlformats.org/drawingml/2006/main" xmlns:r="http://schemas.openxmlformats.org/officeDocument/2006/relationships" xmlns:p="http://schemas.openxmlformats.org/presentationml/2006/main">
+  <p:cSld>
+    <p:spTree>
+      <p:nvGrpSpPr>
+        <p:cNvPr id="1" name=""/>
+        <p:cNvGrpSpPr/>
+        <p:nvPr/>
+      </p:nvGrpSpPr>
+      <p:grpSpPr>
+        <a:xfrm>
+          <a:off x="0" y="0"/>
+          <a:ext cx="0" cy="0"/>
+          <a:chOff x="0" y="0"/>
+          <a:chExt cx="0" cy="0"/>
+        </a:xfrm>
+      </p:grpSpPr>
+      <p:sp>
+        <p:nvSpPr>
+          <p:cNvPr id="2" name="Title 1"/>
+          <p:cNvSpPr>
+            <a:spLocks noGrp="1"/>
+          </p:cNvSpPr>
+          <p:nvPr>
+            <p:ph type="title"/>
+          </p:nvPr>
+        </p:nvSpPr>
+        <p:spPr/>
+        <p:txBody>
+          <a:bodyPr/>
+          <a:lstStyle/>
+          <a:p>
+            <a:r>
+              <a:rPr lang="en-US" dirty="0" smtClean="0"/>
+              <a:t>Discussion</a:t>
+            </a:r>
+            <a:endParaRPr lang="en-IN" dirty="0"/>
+          </a:p>
+        </p:txBody>
+      </p:sp>
+      <p:sp>
+        <p:nvSpPr>
+          <p:cNvPr id="3" name="Content Placeholder 2"/>
+          <p:cNvSpPr>
+            <a:spLocks noGrp="1"/>
+          </p:cNvSpPr>
+          <p:nvPr>
+            <p:ph idx="1"/>
+          </p:nvPr>
+        </p:nvSpPr>
+        <p:spPr/>
+        <p:txBody>
+          <a:bodyPr>
+            <a:normAutofit fontScale="92500" lnSpcReduction="10000"/>
+          </a:bodyPr>
+          <a:lstStyle/>
+          <a:p>
+            <a:r>
+              <a:rPr lang="en-US" dirty="0"/>
+              <a:t>As observed, the result as it is now, the recommendations seem more or less relevant to the user, as the clusters have common.</a:t>
+            </a:r>
+          </a:p>
+          <a:p>
+            <a:r>
+              <a:rPr lang="en-US" dirty="0"/>
+              <a:t>There can be a few optimizations that can be done:</a:t>
+            </a:r>
+          </a:p>
+          <a:p>
+            <a:pPr lvl="1"/>
+            <a:r>
+              <a:rPr lang="en-US" dirty="0" smtClean="0"/>
+              <a:t>Increase </a:t>
+            </a:r>
+            <a:r>
+              <a:rPr lang="en-US" dirty="0"/>
+              <a:t>the number of cluster for more customized suggestions</a:t>
+            </a:r>
+          </a:p>
+          <a:p>
+            <a:pPr lvl="1"/>
+            <a:r>
+              <a:rPr lang="en-US" dirty="0" smtClean="0"/>
+              <a:t>Include </a:t>
+            </a:r>
+            <a:r>
+              <a:rPr lang="en-US" dirty="0" err="1"/>
+              <a:t>datetime</a:t>
+            </a:r>
+            <a:r>
+              <a:rPr lang="en-US" dirty="0"/>
+              <a:t> as a feature while clustering</a:t>
+            </a:r>
+          </a:p>
+          <a:p>
+            <a:pPr lvl="1"/>
+            <a:r>
+              <a:rPr lang="en-US" dirty="0" smtClean="0"/>
+              <a:t>Have </a:t>
+            </a:r>
+            <a:r>
+              <a:rPr lang="en-US" dirty="0"/>
+              <a:t>weighted recommendations by using ratings given by the users for the locations</a:t>
+            </a:r>
+          </a:p>
+          <a:p>
+            <a:endParaRPr lang="en-IN" dirty="0"/>
+          </a:p>
+        </p:txBody>
+      </p:sp>
+    </p:spTree>
+    <p:extLst>
+      <p:ext uri="{BB962C8B-B14F-4D97-AF65-F5344CB8AC3E}">
+        <p14:creationId xmlns:p14="http://schemas.microsoft.com/office/powerpoint/2010/main" val="1938028724"/>
+      </p:ext>
+    </p:extLst>
+  </p:cSld>
+  <p:clrMapOvr>
+    <a:masterClrMapping/>
+  </p:clrMapOvr>
+</p:sld>
+</file>
+
+<file path=ppt/slides/slide24.xml><?xml version="1.0" encoding="utf-8"?>
+<p:sld xmlns:a="http://schemas.openxmlformats.org/drawingml/2006/main" xmlns:r="http://schemas.openxmlformats.org/officeDocument/2006/relationships" xmlns:p="http://schemas.openxmlformats.org/presentationml/2006/main">
+  <p:cSld>
+    <p:spTree>
+      <p:nvGrpSpPr>
+        <p:cNvPr id="1" name=""/>
+        <p:cNvGrpSpPr/>
+        <p:nvPr/>
+      </p:nvGrpSpPr>
+      <p:grpSpPr>
+        <a:xfrm>
+          <a:off x="0" y="0"/>
+          <a:ext cx="0" cy="0"/>
+          <a:chOff x="0" y="0"/>
+          <a:chExt cx="0" cy="0"/>
+        </a:xfrm>
+      </p:grpSpPr>
+      <p:sp>
+        <p:nvSpPr>
+          <p:cNvPr id="2" name="Title 1"/>
+          <p:cNvSpPr>
+            <a:spLocks noGrp="1"/>
+          </p:cNvSpPr>
+          <p:nvPr>
+            <p:ph type="title"/>
+          </p:nvPr>
+        </p:nvSpPr>
+        <p:spPr/>
+        <p:txBody>
+          <a:bodyPr/>
+          <a:lstStyle/>
+          <a:p>
+            <a:r>
+              <a:rPr lang="en-US" dirty="0" smtClean="0"/>
+              <a:t>Conclusion</a:t>
+            </a:r>
+            <a:endParaRPr lang="en-IN" dirty="0"/>
+          </a:p>
+        </p:txBody>
+      </p:sp>
+      <p:sp>
+        <p:nvSpPr>
+          <p:cNvPr id="3" name="Content Placeholder 2"/>
+          <p:cNvSpPr>
+            <a:spLocks noGrp="1"/>
+          </p:cNvSpPr>
+          <p:nvPr>
+            <p:ph idx="1"/>
+          </p:nvPr>
+        </p:nvSpPr>
+        <p:spPr/>
+        <p:txBody>
+          <a:bodyPr/>
+          <a:lstStyle/>
+          <a:p>
+            <a:r>
+              <a:rPr lang="en-IN" dirty="0"/>
+              <a:t>In this project, we have tried to recommend to users, who travel and check-in into various locations, based on their previous check-ins and the people like them, and where they’ve travelled to using </a:t>
+            </a:r>
+            <a:r>
+              <a:rPr lang="en-IN" dirty="0" err="1"/>
+              <a:t>kmeans</a:t>
+            </a:r>
+            <a:r>
+              <a:rPr lang="en-IN"/>
+              <a:t> clustering and basic data analysis methods</a:t>
+            </a:r>
+            <a:endParaRPr lang="en-IN"/>
+          </a:p>
+        </p:txBody>
+      </p:sp>
+    </p:spTree>
+    <p:extLst>
+      <p:ext uri="{BB962C8B-B14F-4D97-AF65-F5344CB8AC3E}">
+        <p14:creationId xmlns:p14="http://schemas.microsoft.com/office/powerpoint/2010/main" val="3312042237"/>
+      </p:ext>
+    </p:extLst>
+  </p:cSld>
+  <p:clrMapOvr>
+    <a:masterClrMapping/>
+  </p:clrMapOvr>
+</p:sld>
+</file>
+
+<file path=ppt/slides/slide3.xml><?xml version="1.0" encoding="utf-8"?>
+<p:sld xmlns:a="http://schemas.openxmlformats.org/drawingml/2006/main" xmlns:r="http://schemas.openxmlformats.org/officeDocument/2006/relationships" xmlns:p="http://schemas.openxmlformats.org/presentationml/2006/main">
+  <p:cSld>
+    <p:spTree>
+      <p:nvGrpSpPr>
+        <p:cNvPr id="1" name=""/>
+        <p:cNvGrpSpPr/>
+        <p:nvPr/>
+      </p:nvGrpSpPr>
+      <p:grpSpPr>
+        <a:xfrm>
+          <a:off x="0" y="0"/>
+          <a:ext cx="0" cy="0"/>
+          <a:chOff x="0" y="0"/>
+          <a:chExt cx="0" cy="0"/>
+        </a:xfrm>
+      </p:grpSpPr>
+      <p:sp>
+        <p:nvSpPr>
+          <p:cNvPr id="2" name="Title 1"/>
+          <p:cNvSpPr>
+            <a:spLocks noGrp="1"/>
+          </p:cNvSpPr>
+          <p:nvPr>
+            <p:ph type="title"/>
+          </p:nvPr>
+        </p:nvSpPr>
+        <p:spPr/>
+        <p:txBody>
+          <a:bodyPr/>
+          <a:lstStyle/>
+          <a:p>
+            <a:r>
+              <a:rPr lang="en-US" dirty="0" smtClean="0"/>
+              <a:t>Data</a:t>
+            </a:r>
+            <a:endParaRPr lang="en-IN" dirty="0"/>
+          </a:p>
+        </p:txBody>
+      </p:sp>
+      <p:sp>
+        <p:nvSpPr>
+          <p:cNvPr id="3" name="Content Placeholder 2"/>
+          <p:cNvSpPr>
+            <a:spLocks noGrp="1"/>
+          </p:cNvSpPr>
+          <p:nvPr>
+            <p:ph idx="1"/>
+          </p:nvPr>
+        </p:nvSpPr>
+        <p:spPr/>
+        <p:txBody>
+          <a:bodyPr/>
+          <a:lstStyle/>
+          <a:p>
+            <a:r>
+              <a:rPr lang="en-US" dirty="0" smtClean="0"/>
+              <a:t>We’ll be using </a:t>
+            </a:r>
+            <a:r>
+              <a:rPr lang="en-US" dirty="0"/>
+              <a:t>the Dataset NYC and Tokyo Check-in Dataset by </a:t>
+            </a:r>
+            <a:r>
+              <a:rPr lang="en-US" dirty="0" err="1"/>
+              <a:t>Dingqi</a:t>
+            </a:r>
+            <a:r>
+              <a:rPr lang="en-US" dirty="0"/>
+              <a:t> Yang </a:t>
+            </a:r>
+          </a:p>
+          <a:p>
+            <a:r>
+              <a:rPr lang="en-IN" dirty="0"/>
+              <a:t>The dataset can be found </a:t>
+            </a:r>
+            <a:r>
+              <a:rPr lang="en-IN" u="sng" dirty="0">
+                <a:hlinkClick r:id="rId2"/>
+              </a:rPr>
+              <a:t>here</a:t>
+            </a:r>
+            <a:r>
+              <a:rPr lang="en-IN" dirty="0"/>
+              <a:t> (about 775MB zipped)</a:t>
+            </a:r>
+          </a:p>
+          <a:p>
+            <a:r>
+              <a:rPr lang="en-US" dirty="0"/>
+              <a:t>This dataset includes long-term (about 10 months) check-in data in New York city and Tokyo collected from Foursquare from 12 April 2012 to 16 February 2013.</a:t>
+            </a:r>
+            <a:endParaRPr lang="en-IN" dirty="0"/>
+          </a:p>
+        </p:txBody>
+      </p:sp>
+    </p:spTree>
+    <p:extLst>
+      <p:ext uri="{BB962C8B-B14F-4D97-AF65-F5344CB8AC3E}">
+        <p14:creationId xmlns:p14="http://schemas.microsoft.com/office/powerpoint/2010/main" val="1688156537"/>
+      </p:ext>
+    </p:extLst>
+  </p:cSld>
+  <p:clrMapOvr>
+    <a:masterClrMapping/>
+  </p:clrMapOvr>
+</p:sld>
+</file>
+
+<file path=ppt/slides/slide4.xml><?xml version="1.0" encoding="utf-8"?>
+<p:sld xmlns:a="http://schemas.openxmlformats.org/drawingml/2006/main" xmlns:r="http://schemas.openxmlformats.org/officeDocument/2006/relationships" xmlns:p="http://schemas.openxmlformats.org/presentationml/2006/main">
+  <p:cSld>
+    <p:spTree>
+      <p:nvGrpSpPr>
+        <p:cNvPr id="1" name=""/>
+        <p:cNvGrpSpPr/>
+        <p:nvPr/>
+      </p:nvGrpSpPr>
+      <p:grpSpPr>
+        <a:xfrm>
+          <a:off x="0" y="0"/>
+          <a:ext cx="0" cy="0"/>
+          <a:chOff x="0" y="0"/>
+          <a:chExt cx="0" cy="0"/>
+        </a:xfrm>
+      </p:grpSpPr>
+      <p:sp>
+        <p:nvSpPr>
+          <p:cNvPr id="2" name="Title 1"/>
+          <p:cNvSpPr>
+            <a:spLocks noGrp="1"/>
+          </p:cNvSpPr>
+          <p:nvPr>
+            <p:ph type="title"/>
+          </p:nvPr>
+        </p:nvSpPr>
+        <p:spPr/>
+        <p:txBody>
+          <a:bodyPr/>
+          <a:lstStyle/>
+          <a:p>
+            <a:r>
+              <a:rPr lang="en-US" dirty="0" smtClean="0"/>
+              <a:t>Data</a:t>
+            </a:r>
+            <a:endParaRPr lang="en-IN" dirty="0"/>
+          </a:p>
+        </p:txBody>
+      </p:sp>
+      <p:sp>
+        <p:nvSpPr>
+          <p:cNvPr id="3" name="Content Placeholder 2"/>
+          <p:cNvSpPr>
+            <a:spLocks noGrp="1"/>
+          </p:cNvSpPr>
+          <p:nvPr>
+            <p:ph idx="1"/>
+          </p:nvPr>
+        </p:nvSpPr>
+        <p:spPr/>
+        <p:txBody>
+          <a:bodyPr>
+            <a:normAutofit fontScale="77500" lnSpcReduction="20000"/>
+          </a:bodyPr>
+          <a:lstStyle/>
+          <a:p>
+            <a:pPr marL="0" indent="0">
+              <a:buNone/>
+            </a:pPr>
+            <a:r>
+              <a:rPr lang="en-US" dirty="0" smtClean="0"/>
+              <a:t>It </a:t>
+            </a:r>
+            <a:r>
+              <a:rPr lang="en-US" dirty="0"/>
+              <a:t>contains two files in </a:t>
+            </a:r>
+            <a:r>
+              <a:rPr lang="en-US" dirty="0" err="1"/>
+              <a:t>tsv</a:t>
+            </a:r>
+            <a:r>
+              <a:rPr lang="en-US" dirty="0"/>
+              <a:t> format. Each file contains 8 columns, which are:</a:t>
+            </a:r>
+          </a:p>
+          <a:p>
+            <a:pPr marL="514350" indent="-514350">
+              <a:buFont typeface="+mj-lt"/>
+              <a:buAutoNum type="arabicPeriod"/>
+            </a:pPr>
+            <a:r>
+              <a:rPr lang="en-US" dirty="0" smtClean="0"/>
+              <a:t>User </a:t>
+            </a:r>
+            <a:r>
+              <a:rPr lang="en-US" dirty="0"/>
+              <a:t>ID (</a:t>
+            </a:r>
+            <a:r>
+              <a:rPr lang="en-US" dirty="0" err="1"/>
+              <a:t>anonymized</a:t>
+            </a:r>
+            <a:r>
+              <a:rPr lang="en-US" dirty="0"/>
+              <a:t>)</a:t>
+            </a:r>
+          </a:p>
+          <a:p>
+            <a:pPr marL="514350" indent="-514350">
+              <a:buFont typeface="+mj-lt"/>
+              <a:buAutoNum type="arabicPeriod"/>
+            </a:pPr>
+            <a:r>
+              <a:rPr lang="en-US" dirty="0" smtClean="0"/>
+              <a:t>Venue </a:t>
+            </a:r>
+            <a:r>
+              <a:rPr lang="en-US" dirty="0"/>
+              <a:t>ID (Foursquare)</a:t>
+            </a:r>
+          </a:p>
+          <a:p>
+            <a:pPr marL="514350" indent="-514350">
+              <a:buFont typeface="+mj-lt"/>
+              <a:buAutoNum type="arabicPeriod"/>
+            </a:pPr>
+            <a:r>
+              <a:rPr lang="en-US" dirty="0" smtClean="0"/>
+              <a:t>Venue </a:t>
+            </a:r>
+            <a:r>
+              <a:rPr lang="en-US" dirty="0"/>
+              <a:t>category ID (Foursquare)</a:t>
+            </a:r>
+          </a:p>
+          <a:p>
+            <a:pPr marL="514350" indent="-514350">
+              <a:buFont typeface="+mj-lt"/>
+              <a:buAutoNum type="arabicPeriod"/>
+            </a:pPr>
+            <a:r>
+              <a:rPr lang="en-US" dirty="0" smtClean="0"/>
+              <a:t>Venue </a:t>
+            </a:r>
+            <a:r>
+              <a:rPr lang="en-US" dirty="0"/>
+              <a:t>category name (</a:t>
+            </a:r>
+            <a:r>
+              <a:rPr lang="en-US" dirty="0" err="1"/>
+              <a:t>Fousquare</a:t>
+            </a:r>
+            <a:r>
+              <a:rPr lang="en-US" dirty="0"/>
+              <a:t>)</a:t>
+            </a:r>
+          </a:p>
+          <a:p>
+            <a:pPr marL="514350" indent="-514350">
+              <a:buFont typeface="+mj-lt"/>
+              <a:buAutoNum type="arabicPeriod"/>
+            </a:pPr>
+            <a:r>
+              <a:rPr lang="en-US" dirty="0" smtClean="0"/>
+              <a:t> </a:t>
+            </a:r>
+            <a:r>
+              <a:rPr lang="en-US" dirty="0"/>
+              <a:t>Latitude</a:t>
+            </a:r>
+          </a:p>
+          <a:p>
+            <a:pPr marL="514350" indent="-514350">
+              <a:buFont typeface="+mj-lt"/>
+              <a:buAutoNum type="arabicPeriod"/>
+            </a:pPr>
+            <a:r>
+              <a:rPr lang="en-US" dirty="0" smtClean="0"/>
+              <a:t> </a:t>
+            </a:r>
+            <a:r>
+              <a:rPr lang="en-US" dirty="0"/>
+              <a:t>Longitude</a:t>
+            </a:r>
+          </a:p>
+          <a:p>
+            <a:pPr marL="514350" indent="-514350">
+              <a:buFont typeface="+mj-lt"/>
+              <a:buAutoNum type="arabicPeriod"/>
+            </a:pPr>
+            <a:r>
+              <a:rPr lang="en-US" dirty="0" err="1" smtClean="0"/>
+              <a:t>Timezone</a:t>
+            </a:r>
+            <a:r>
+              <a:rPr lang="en-US" dirty="0" smtClean="0"/>
+              <a:t> </a:t>
+            </a:r>
+            <a:r>
+              <a:rPr lang="en-US" dirty="0"/>
+              <a:t>offset in minutes (The offset in minutes between when this check-in occurred and the same time in UTC)</a:t>
+            </a:r>
+          </a:p>
+          <a:p>
+            <a:pPr marL="514350" indent="-514350">
+              <a:buFont typeface="+mj-lt"/>
+              <a:buAutoNum type="arabicPeriod"/>
+            </a:pPr>
+            <a:r>
+              <a:rPr lang="en-US" dirty="0" smtClean="0"/>
+              <a:t> </a:t>
+            </a:r>
+            <a:r>
+              <a:rPr lang="en-US" dirty="0"/>
+              <a:t>UTC time</a:t>
+            </a:r>
+          </a:p>
+          <a:p>
+            <a:endParaRPr lang="en-IN" dirty="0"/>
+          </a:p>
+        </p:txBody>
+      </p:sp>
+    </p:spTree>
+    <p:extLst>
+      <p:ext uri="{BB962C8B-B14F-4D97-AF65-F5344CB8AC3E}">
+        <p14:creationId xmlns:p14="http://schemas.microsoft.com/office/powerpoint/2010/main" val="1870018508"/>
+      </p:ext>
+    </p:extLst>
+  </p:cSld>
+  <p:clrMapOvr>
+    <a:masterClrMapping/>
+  </p:clrMapOvr>
+</p:sld>
+</file>
+
+<file path=ppt/slides/slide5.xml><?xml version="1.0" encoding="utf-8"?>
+<p:sld xmlns:a="http://schemas.openxmlformats.org/drawingml/2006/main" xmlns:r="http://schemas.openxmlformats.org/officeDocument/2006/relationships" xmlns:p="http://schemas.openxmlformats.org/presentationml/2006/main">
+  <p:cSld>
+    <p:spTree>
+      <p:nvGrpSpPr>
+        <p:cNvPr id="1" name=""/>
+        <p:cNvGrpSpPr/>
+        <p:nvPr/>
+      </p:nvGrpSpPr>
+      <p:grpSpPr>
+        <a:xfrm>
+          <a:off x="0" y="0"/>
+          <a:ext cx="0" cy="0"/>
+          <a:chOff x="0" y="0"/>
+          <a:chExt cx="0" cy="0"/>
+        </a:xfrm>
+      </p:grpSpPr>
+      <p:sp>
+        <p:nvSpPr>
+          <p:cNvPr id="2" name="Title 1"/>
+          <p:cNvSpPr>
+            <a:spLocks noGrp="1"/>
+          </p:cNvSpPr>
+          <p:nvPr>
+            <p:ph type="title"/>
+          </p:nvPr>
+        </p:nvSpPr>
+        <p:spPr/>
+        <p:txBody>
+          <a:bodyPr/>
+          <a:lstStyle/>
+          <a:p>
+            <a:r>
+              <a:rPr lang="en-US" dirty="0" smtClean="0"/>
+              <a:t>Data</a:t>
+            </a:r>
+            <a:endParaRPr lang="en-IN" dirty="0"/>
+          </a:p>
+        </p:txBody>
+      </p:sp>
+      <p:sp>
+        <p:nvSpPr>
+          <p:cNvPr id="3" name="Content Placeholder 2"/>
+          <p:cNvSpPr>
+            <a:spLocks noGrp="1"/>
+          </p:cNvSpPr>
+          <p:nvPr>
+            <p:ph idx="1"/>
+          </p:nvPr>
+        </p:nvSpPr>
+        <p:spPr/>
+        <p:txBody>
+          <a:bodyPr/>
+          <a:lstStyle/>
+          <a:p>
+            <a:endParaRPr lang="en-US" dirty="0" smtClean="0"/>
+          </a:p>
+          <a:p>
+            <a:r>
+              <a:rPr lang="en-US" dirty="0" smtClean="0"/>
+              <a:t>The </a:t>
+            </a:r>
+            <a:r>
+              <a:rPr lang="en-US" dirty="0"/>
+              <a:t>file dataset_TSMC2014_NYC.txt contains 227428 check-ins in New York City</a:t>
+            </a:r>
+            <a:r>
+              <a:rPr lang="en-US" dirty="0" smtClean="0"/>
+              <a:t>.</a:t>
+            </a:r>
+          </a:p>
+          <a:p>
+            <a:endParaRPr lang="en-US" dirty="0"/>
+          </a:p>
+          <a:p>
+            <a:r>
+              <a:rPr lang="en-US" dirty="0"/>
+              <a:t>The file dataset_TSMC2014_TKY.txt contains 537703 check-ins in Tokyo.</a:t>
+            </a:r>
+          </a:p>
+          <a:p>
+            <a:endParaRPr lang="en-IN" dirty="0"/>
+          </a:p>
+        </p:txBody>
+      </p:sp>
+    </p:spTree>
+    <p:extLst>
+      <p:ext uri="{BB962C8B-B14F-4D97-AF65-F5344CB8AC3E}">
+        <p14:creationId xmlns:p14="http://schemas.microsoft.com/office/powerpoint/2010/main" val="843028125"/>
+      </p:ext>
+    </p:extLst>
+  </p:cSld>
+  <p:clrMapOvr>
+    <a:masterClrMapping/>
+  </p:clrMapOvr>
+</p:sld>
+</file>
+
+<file path=ppt/slides/slide6.xml><?xml version="1.0" encoding="utf-8"?>
+<p:sld xmlns:a="http://schemas.openxmlformats.org/drawingml/2006/main" xmlns:r="http://schemas.openxmlformats.org/officeDocument/2006/relationships" xmlns:p="http://schemas.openxmlformats.org/presentationml/2006/main">
+  <p:cSld>
+    <p:spTree>
+      <p:nvGrpSpPr>
+        <p:cNvPr id="1" name=""/>
+        <p:cNvGrpSpPr/>
+        <p:nvPr/>
+      </p:nvGrpSpPr>
+      <p:grpSpPr>
+        <a:xfrm>
+          <a:off x="0" y="0"/>
+          <a:ext cx="0" cy="0"/>
+          <a:chOff x="0" y="0"/>
+          <a:chExt cx="0" cy="0"/>
+        </a:xfrm>
+      </p:grpSpPr>
+      <p:sp>
+        <p:nvSpPr>
+          <p:cNvPr id="2" name="Title 1"/>
+          <p:cNvSpPr>
+            <a:spLocks noGrp="1"/>
+          </p:cNvSpPr>
+          <p:nvPr>
+            <p:ph type="title"/>
+          </p:nvPr>
+        </p:nvSpPr>
+        <p:spPr/>
+        <p:txBody>
+          <a:bodyPr/>
+          <a:lstStyle/>
+          <a:p>
+            <a:r>
+              <a:rPr lang="en-US" dirty="0" smtClean="0"/>
+              <a:t>Methodology</a:t>
+            </a:r>
+            <a:endParaRPr lang="en-IN" dirty="0"/>
+          </a:p>
+        </p:txBody>
+      </p:sp>
+      <p:sp>
+        <p:nvSpPr>
+          <p:cNvPr id="3" name="Content Placeholder 2"/>
+          <p:cNvSpPr>
+            <a:spLocks noGrp="1"/>
+          </p:cNvSpPr>
+          <p:nvPr>
+            <p:ph idx="1"/>
+          </p:nvPr>
+        </p:nvSpPr>
+        <p:spPr/>
+        <p:txBody>
+          <a:bodyPr>
+            <a:normAutofit lnSpcReduction="10000"/>
+          </a:bodyPr>
+          <a:lstStyle/>
+          <a:p>
+            <a:pPr marL="0" indent="0">
+              <a:buNone/>
+            </a:pPr>
+            <a:r>
+              <a:rPr lang="en-IN" dirty="0"/>
+              <a:t>This project can be fragmented into the following parts:</a:t>
+            </a:r>
+          </a:p>
+          <a:p>
+            <a:pPr marL="514350" lvl="0" indent="-514350">
+              <a:buFont typeface="+mj-lt"/>
+              <a:buAutoNum type="arabicPeriod"/>
+            </a:pPr>
+            <a:r>
+              <a:rPr lang="en-IN" dirty="0"/>
+              <a:t>Data loading</a:t>
+            </a:r>
+          </a:p>
+          <a:p>
+            <a:pPr marL="514350" lvl="0" indent="-514350">
+              <a:buFont typeface="+mj-lt"/>
+              <a:buAutoNum type="arabicPeriod"/>
+            </a:pPr>
+            <a:r>
+              <a:rPr lang="en-IN" dirty="0"/>
+              <a:t>Data preparation</a:t>
+            </a:r>
+          </a:p>
+          <a:p>
+            <a:pPr marL="514350" lvl="0" indent="-514350">
+              <a:buFont typeface="+mj-lt"/>
+              <a:buAutoNum type="arabicPeriod"/>
+            </a:pPr>
+            <a:r>
+              <a:rPr lang="en-IN" dirty="0"/>
+              <a:t>Clustering of users on prepared data</a:t>
+            </a:r>
+          </a:p>
+          <a:p>
+            <a:pPr marL="514350" lvl="0" indent="-514350">
+              <a:buFont typeface="+mj-lt"/>
+              <a:buAutoNum type="arabicPeriod"/>
+            </a:pPr>
+            <a:r>
+              <a:rPr lang="en-IN" dirty="0"/>
+              <a:t>Re-structuring data for recommendation</a:t>
+            </a:r>
+          </a:p>
+          <a:p>
+            <a:pPr marL="514350" lvl="0" indent="-514350">
+              <a:buFont typeface="+mj-lt"/>
+              <a:buAutoNum type="arabicPeriod"/>
+            </a:pPr>
+            <a:r>
+              <a:rPr lang="en-IN" dirty="0"/>
+              <a:t>Finding all recommendations</a:t>
+            </a:r>
+          </a:p>
+          <a:p>
+            <a:pPr marL="514350" lvl="0" indent="-514350">
+              <a:buFont typeface="+mj-lt"/>
+              <a:buAutoNum type="arabicPeriod"/>
+            </a:pPr>
+            <a:r>
+              <a:rPr lang="en-IN" dirty="0"/>
+              <a:t>Displaying recommendations on the Map</a:t>
+            </a:r>
+          </a:p>
+          <a:p>
+            <a:endParaRPr lang="en-IN" dirty="0"/>
+          </a:p>
+        </p:txBody>
+      </p:sp>
+    </p:spTree>
+    <p:extLst>
+      <p:ext uri="{BB962C8B-B14F-4D97-AF65-F5344CB8AC3E}">
+        <p14:creationId xmlns:p14="http://schemas.microsoft.com/office/powerpoint/2010/main" val="1758039221"/>
+      </p:ext>
+    </p:extLst>
+  </p:cSld>
+  <p:clrMapOvr>
+    <a:masterClrMapping/>
+  </p:clrMapOvr>
+</p:sld>
+</file>
+
+<file path=ppt/slides/slide7.xml><?xml version="1.0" encoding="utf-8"?>
+<p:sld xmlns:a="http://schemas.openxmlformats.org/drawingml/2006/main" xmlns:r="http://schemas.openxmlformats.org/officeDocument/2006/relationships" xmlns:p="http://schemas.openxmlformats.org/presentationml/2006/main">
+  <p:cSld>
+    <p:spTree>
+      <p:nvGrpSpPr>
+        <p:cNvPr id="1" name=""/>
+        <p:cNvGrpSpPr/>
+        <p:nvPr/>
+      </p:nvGrpSpPr>
+      <p:grpSpPr>
+        <a:xfrm>
+          <a:off x="0" y="0"/>
+          <a:ext cx="0" cy="0"/>
+          <a:chOff x="0" y="0"/>
+          <a:chExt cx="0" cy="0"/>
+        </a:xfrm>
+      </p:grpSpPr>
+      <p:sp>
+        <p:nvSpPr>
+          <p:cNvPr id="2" name="Title 1"/>
+          <p:cNvSpPr>
+            <a:spLocks noGrp="1"/>
+          </p:cNvSpPr>
+          <p:nvPr>
+            <p:ph type="title"/>
+          </p:nvPr>
+        </p:nvSpPr>
+        <p:spPr/>
+        <p:txBody>
+          <a:bodyPr/>
+          <a:lstStyle/>
+          <a:p>
+            <a:r>
+              <a:rPr lang="en-US" dirty="0" smtClean="0"/>
+              <a:t>Data Loading</a:t>
+            </a:r>
+            <a:endParaRPr lang="en-IN" dirty="0"/>
+          </a:p>
+        </p:txBody>
+      </p:sp>
+      <p:sp>
+        <p:nvSpPr>
+          <p:cNvPr id="3" name="Content Placeholder 2"/>
+          <p:cNvSpPr>
+            <a:spLocks noGrp="1"/>
+          </p:cNvSpPr>
+          <p:nvPr>
+            <p:ph idx="1"/>
+          </p:nvPr>
+        </p:nvSpPr>
+        <p:spPr/>
+        <p:txBody>
+          <a:bodyPr/>
+          <a:lstStyle/>
+          <a:p>
+            <a:r>
+              <a:rPr lang="en-IN" dirty="0"/>
+              <a:t>For ease of access, the given files are loaded onto a </a:t>
+            </a:r>
+            <a:r>
+              <a:rPr lang="en-IN" dirty="0" err="1"/>
+              <a:t>google</a:t>
+            </a:r>
+            <a:r>
+              <a:rPr lang="en-IN" dirty="0"/>
+              <a:t> drive, and are loaded onto local runtime using Google </a:t>
+            </a:r>
+            <a:r>
+              <a:rPr lang="en-IN" dirty="0" err="1"/>
+              <a:t>Colab</a:t>
+            </a:r>
+            <a:r>
+              <a:rPr lang="en-IN" dirty="0"/>
+              <a:t>(Primary Platform for development of the code for this project).</a:t>
+            </a:r>
+          </a:p>
+          <a:p>
+            <a:endParaRPr lang="en-IN" dirty="0"/>
+          </a:p>
+        </p:txBody>
+      </p:sp>
+    </p:spTree>
+    <p:extLst>
+      <p:ext uri="{BB962C8B-B14F-4D97-AF65-F5344CB8AC3E}">
+        <p14:creationId xmlns:p14="http://schemas.microsoft.com/office/powerpoint/2010/main" val="2667919932"/>
+      </p:ext>
+    </p:extLst>
+  </p:cSld>
+  <p:clrMapOvr>
+    <a:masterClrMapping/>
+  </p:clrMapOvr>
+  <p:timing>
+    <p:tnLst>
+      <p:par>
+        <p:cTn id="1" dur="indefinite" restart="never" nodeType="tmRoot"/>
+      </p:par>
+    </p:tnLst>
+  </p:timing>
+</p:sld>
+</file>
+
+<file path=ppt/slides/slide8.xml><?xml version="1.0" encoding="utf-8"?>
+<p:sld xmlns:a="http://schemas.openxmlformats.org/drawingml/2006/main" xmlns:r="http://schemas.openxmlformats.org/officeDocument/2006/relationships" xmlns:p="http://schemas.openxmlformats.org/presentationml/2006/main">
+  <p:cSld>
+    <p:spTree>
+      <p:nvGrpSpPr>
+        <p:cNvPr id="1" name=""/>
+        <p:cNvGrpSpPr/>
+        <p:nvPr/>
+      </p:nvGrpSpPr>
+      <p:grpSpPr>
+        <a:xfrm>
+          <a:off x="0" y="0"/>
+          <a:ext cx="0" cy="0"/>
+          <a:chOff x="0" y="0"/>
+          <a:chExt cx="0" cy="0"/>
+        </a:xfrm>
+      </p:grpSpPr>
+      <p:sp>
+        <p:nvSpPr>
+          <p:cNvPr id="4" name="Title 3"/>
+          <p:cNvSpPr>
+            <a:spLocks noGrp="1"/>
+          </p:cNvSpPr>
+          <p:nvPr>
+            <p:ph type="title"/>
+          </p:nvPr>
+        </p:nvSpPr>
+        <p:spPr/>
+        <p:txBody>
+          <a:bodyPr/>
+          <a:lstStyle/>
+          <a:p>
+            <a:endParaRPr lang="en-IN"/>
+          </a:p>
+        </p:txBody>
+      </p:sp>
+      <p:sp>
+        <p:nvSpPr>
+          <p:cNvPr id="6" name="Text Placeholder 5"/>
+          <p:cNvSpPr>
+            <a:spLocks noGrp="1"/>
+          </p:cNvSpPr>
+          <p:nvPr>
+            <p:ph type="body" sz="half" idx="2"/>
+          </p:nvPr>
+        </p:nvSpPr>
+        <p:spPr/>
+        <p:txBody>
+          <a:bodyPr/>
+          <a:lstStyle/>
+          <a:p>
+            <a:endParaRPr lang="en-IN"/>
+          </a:p>
+        </p:txBody>
+      </p:sp>
+      <p:pic>
+        <p:nvPicPr>
+          <p:cNvPr id="9" name="Picture Placeholder 8"/>
+          <p:cNvPicPr>
+            <a:picLocks noGrp="1"/>
+          </p:cNvPicPr>
+          <p:nvPr>
+            <p:ph type="pic" idx="1"/>
+          </p:nvPr>
+        </p:nvPicPr>
+        <p:blipFill rotWithShape="1">
+          <a:blip r:embed="rId2"/>
+          <a:srcRect l="-277" t="-826" r="-267" b="-3964"/>
+          <a:stretch/>
+        </p:blipFill>
+        <p:spPr>
+          <a:xfrm>
+            <a:off x="-180528" y="1772816"/>
+            <a:ext cx="9324528" cy="2520280"/>
+          </a:xfrm>
+          <a:prstGeom prst="rect">
+            <a:avLst/>
+          </a:prstGeom>
+        </p:spPr>
+      </p:pic>
+    </p:spTree>
+    <p:extLst>
+      <p:ext uri="{BB962C8B-B14F-4D97-AF65-F5344CB8AC3E}">
+        <p14:creationId xmlns:p14="http://schemas.microsoft.com/office/powerpoint/2010/main" val="4047899748"/>
+      </p:ext>
+    </p:extLst>
+  </p:cSld>
+  <p:clrMapOvr>
+    <a:masterClrMapping/>
+  </p:clrMapOvr>
+  <p:timing>
+    <p:tnLst>
+      <p:par>
+        <p:cTn id="1" dur="indefinite" restart="never" nodeType="tmRoot"/>
+      </p:par>
+    </p:tnLst>
+  </p:timing>
+</p:sld>
+</file>
+
+<file path=ppt/slides/slide9.xml><?xml version="1.0" encoding="utf-8"?>
+<p:sld xmlns:a="http://schemas.openxmlformats.org/drawingml/2006/main" xmlns:r="http://schemas.openxmlformats.org/officeDocument/2006/relationships" xmlns:p="http://schemas.openxmlformats.org/presentationml/2006/main">
+  <p:cSld>
+    <p:spTree>
+      <p:nvGrpSpPr>
+        <p:cNvPr id="1" name=""/>
+        <p:cNvGrpSpPr/>
+        <p:nvPr/>
+      </p:nvGrpSpPr>
+      <p:grpSpPr>
+        <a:xfrm>
+          <a:off x="0" y="0"/>
+          <a:ext cx="0" cy="0"/>
+          <a:chOff x="0" y="0"/>
+          <a:chExt cx="0" cy="0"/>
+        </a:xfrm>
+      </p:grpSpPr>
+      <p:sp>
+        <p:nvSpPr>
+          <p:cNvPr id="2" name="Title 1"/>
+          <p:cNvSpPr>
+            <a:spLocks noGrp="1"/>
+          </p:cNvSpPr>
+          <p:nvPr>
+            <p:ph type="title"/>
+          </p:nvPr>
+        </p:nvSpPr>
+        <p:spPr/>
+        <p:txBody>
+          <a:bodyPr/>
+          <a:lstStyle/>
+          <a:p>
+            <a:r>
+              <a:rPr lang="en-US" dirty="0" smtClean="0"/>
+              <a:t>Data loading</a:t>
+            </a:r>
+            <a:endParaRPr lang="en-IN" dirty="0"/>
+          </a:p>
+        </p:txBody>
+      </p:sp>
+      <p:sp>
+        <p:nvSpPr>
+          <p:cNvPr id="3" name="Content Placeholder 2"/>
+          <p:cNvSpPr>
+            <a:spLocks noGrp="1"/>
+          </p:cNvSpPr>
+          <p:nvPr>
+            <p:ph idx="1"/>
+          </p:nvPr>
+        </p:nvSpPr>
+        <p:spPr/>
+        <p:txBody>
+          <a:bodyPr/>
+          <a:lstStyle/>
+          <a:p>
+            <a:r>
+              <a:rPr lang="en-IN" dirty="0"/>
+              <a:t>Once the files are uploaded to the local runtime, they are read into pandas </a:t>
+            </a:r>
+            <a:r>
+              <a:rPr lang="en-IN" dirty="0" err="1"/>
+              <a:t>dataframes</a:t>
+            </a:r>
+            <a:r>
+              <a:rPr lang="en-IN" dirty="0"/>
+              <a:t> for analysis.</a:t>
+            </a:r>
+          </a:p>
+          <a:p>
+            <a:endParaRPr lang="en-IN" dirty="0"/>
+          </a:p>
+        </p:txBody>
+      </p:sp>
+    </p:spTree>
+    <p:extLst>
+      <p:ext uri="{BB962C8B-B14F-4D97-AF65-F5344CB8AC3E}">
+        <p14:creationId xmlns:p14="http://schemas.microsoft.com/office/powerpoint/2010/main" val="7461201"/>
+      </p:ext>
+    </p:extLst>
+  </p:cSld>
+  <p:clrMapOvr>
+    <a:masterClrMapping/>
+  </p:clrMapOvr>
+  <p:timing>
+    <p:tnLst>
+      <p:par>
+        <p:cTn id="1" dur="indefinite" restart="never" nodeType="tmRoot"/>
+      </p:par>
+    </p:tnLst>
+  </p:timing>
 </p:sld>
 </file>
 

</xml_diff>